<commit_message>
Added The updated files
</commit_message>
<xml_diff>
--- a/Report_docs/2022HT80170_ppt.pptx
+++ b/Report_docs/2022HT80170_ppt.pptx
@@ -292,7 +292,7 @@
           <a:p>
             <a:fld id="{D0A6EFE7-49CF-41CD-8532-F915F2717F0A}" type="datetimeFigureOut">
               <a:rPr lang="en-US" smtClean="0"/>
-              <a:t>4/27/2024</a:t>
+              <a:t>4/28/2024</a:t>
             </a:fld>
             <a:endParaRPr lang="en-US"/>
           </a:p>
@@ -607,7 +607,7 @@
           <a:p>
             <a:fld id="{D0A6EFE7-49CF-41CD-8532-F915F2717F0A}" type="datetimeFigureOut">
               <a:rPr lang="en-US" smtClean="0"/>
-              <a:t>4/27/2024</a:t>
+              <a:t>4/28/2024</a:t>
             </a:fld>
             <a:endParaRPr lang="en-US"/>
           </a:p>
@@ -829,7 +829,7 @@
           <a:p>
             <a:fld id="{D0A6EFE7-49CF-41CD-8532-F915F2717F0A}" type="datetimeFigureOut">
               <a:rPr lang="en-US" smtClean="0"/>
-              <a:t>4/27/2024</a:t>
+              <a:t>4/28/2024</a:t>
             </a:fld>
             <a:endParaRPr lang="en-US"/>
           </a:p>
@@ -1120,7 +1120,7 @@
           <a:p>
             <a:fld id="{D0A6EFE7-49CF-41CD-8532-F915F2717F0A}" type="datetimeFigureOut">
               <a:rPr lang="en-US" smtClean="0"/>
-              <a:t>4/27/2024</a:t>
+              <a:t>4/28/2024</a:t>
             </a:fld>
             <a:endParaRPr lang="en-US"/>
           </a:p>
@@ -1574,7 +1574,7 @@
           <a:p>
             <a:fld id="{D0A6EFE7-49CF-41CD-8532-F915F2717F0A}" type="datetimeFigureOut">
               <a:rPr lang="en-US" smtClean="0"/>
-              <a:t>4/27/2024</a:t>
+              <a:t>4/28/2024</a:t>
             </a:fld>
             <a:endParaRPr lang="en-US"/>
           </a:p>
@@ -2150,7 +2150,7 @@
           <a:p>
             <a:fld id="{D0A6EFE7-49CF-41CD-8532-F915F2717F0A}" type="datetimeFigureOut">
               <a:rPr lang="en-US" smtClean="0"/>
-              <a:t>4/27/2024</a:t>
+              <a:t>4/28/2024</a:t>
             </a:fld>
             <a:endParaRPr lang="en-US"/>
           </a:p>
@@ -3011,7 +3011,7 @@
           <a:p>
             <a:fld id="{D0A6EFE7-49CF-41CD-8532-F915F2717F0A}" type="datetimeFigureOut">
               <a:rPr lang="en-US" smtClean="0"/>
-              <a:t>4/27/2024</a:t>
+              <a:t>4/28/2024</a:t>
             </a:fld>
             <a:endParaRPr lang="en-US"/>
           </a:p>
@@ -3216,7 +3216,7 @@
           <a:p>
             <a:fld id="{D0A6EFE7-49CF-41CD-8532-F915F2717F0A}" type="datetimeFigureOut">
               <a:rPr lang="en-US" smtClean="0"/>
-              <a:t>4/27/2024</a:t>
+              <a:t>4/28/2024</a:t>
             </a:fld>
             <a:endParaRPr lang="en-US"/>
           </a:p>
@@ -3430,7 +3430,7 @@
           <a:p>
             <a:fld id="{D0A6EFE7-49CF-41CD-8532-F915F2717F0A}" type="datetimeFigureOut">
               <a:rPr lang="en-US" smtClean="0"/>
-              <a:t>4/27/2024</a:t>
+              <a:t>4/28/2024</a:t>
             </a:fld>
             <a:endParaRPr lang="en-US"/>
           </a:p>
@@ -3606,7 +3606,7 @@
           <a:p>
             <a:fld id="{D0A6EFE7-49CF-41CD-8532-F915F2717F0A}" type="datetimeFigureOut">
               <a:rPr lang="en-US" smtClean="0"/>
-              <a:t>4/27/2024</a:t>
+              <a:t>4/28/2024</a:t>
             </a:fld>
             <a:endParaRPr lang="en-US"/>
           </a:p>
@@ -3811,7 +3811,7 @@
           <a:p>
             <a:fld id="{D0A6EFE7-49CF-41CD-8532-F915F2717F0A}" type="datetimeFigureOut">
               <a:rPr lang="en-US" smtClean="0"/>
-              <a:t>4/27/2024</a:t>
+              <a:t>4/28/2024</a:t>
             </a:fld>
             <a:endParaRPr lang="en-US"/>
           </a:p>
@@ -4091,7 +4091,7 @@
           <a:p>
             <a:fld id="{D0A6EFE7-49CF-41CD-8532-F915F2717F0A}" type="datetimeFigureOut">
               <a:rPr lang="en-US" smtClean="0"/>
-              <a:t>4/27/2024</a:t>
+              <a:t>4/28/2024</a:t>
             </a:fld>
             <a:endParaRPr lang="en-US"/>
           </a:p>
@@ -4358,7 +4358,7 @@
           <a:p>
             <a:fld id="{D0A6EFE7-49CF-41CD-8532-F915F2717F0A}" type="datetimeFigureOut">
               <a:rPr lang="en-US" smtClean="0"/>
-              <a:t>4/27/2024</a:t>
+              <a:t>4/28/2024</a:t>
             </a:fld>
             <a:endParaRPr lang="en-US"/>
           </a:p>
@@ -4773,7 +4773,7 @@
           <a:p>
             <a:fld id="{D0A6EFE7-49CF-41CD-8532-F915F2717F0A}" type="datetimeFigureOut">
               <a:rPr lang="en-US" smtClean="0"/>
-              <a:t>4/27/2024</a:t>
+              <a:t>4/28/2024</a:t>
             </a:fld>
             <a:endParaRPr lang="en-US"/>
           </a:p>
@@ -4921,7 +4921,7 @@
           <a:p>
             <a:fld id="{D0A6EFE7-49CF-41CD-8532-F915F2717F0A}" type="datetimeFigureOut">
               <a:rPr lang="en-US" smtClean="0"/>
-              <a:t>4/27/2024</a:t>
+              <a:t>4/28/2024</a:t>
             </a:fld>
             <a:endParaRPr lang="en-US"/>
           </a:p>
@@ -5046,7 +5046,7 @@
           <a:p>
             <a:fld id="{D0A6EFE7-49CF-41CD-8532-F915F2717F0A}" type="datetimeFigureOut">
               <a:rPr lang="en-US" smtClean="0"/>
-              <a:t>4/27/2024</a:t>
+              <a:t>4/28/2024</a:t>
             </a:fld>
             <a:endParaRPr lang="en-US"/>
           </a:p>
@@ -5325,7 +5325,7 @@
           <a:p>
             <a:fld id="{D0A6EFE7-49CF-41CD-8532-F915F2717F0A}" type="datetimeFigureOut">
               <a:rPr lang="en-US" smtClean="0"/>
-              <a:t>4/27/2024</a:t>
+              <a:t>4/28/2024</a:t>
             </a:fld>
             <a:endParaRPr lang="en-US"/>
           </a:p>
@@ -5640,7 +5640,7 @@
           <a:p>
             <a:fld id="{D0A6EFE7-49CF-41CD-8532-F915F2717F0A}" type="datetimeFigureOut">
               <a:rPr lang="en-US" smtClean="0"/>
-              <a:t>4/27/2024</a:t>
+              <a:t>4/28/2024</a:t>
             </a:fld>
             <a:endParaRPr lang="en-US"/>
           </a:p>
@@ -5893,7 +5893,7 @@
           <a:p>
             <a:fld id="{D0A6EFE7-49CF-41CD-8532-F915F2717F0A}" type="datetimeFigureOut">
               <a:rPr lang="en-US" smtClean="0"/>
-              <a:t>4/27/2024</a:t>
+              <a:t>4/28/2024</a:t>
             </a:fld>
             <a:endParaRPr lang="en-US"/>
           </a:p>
@@ -6627,7 +6627,7 @@
                 <a:ea typeface="Calibri" panose="020F0502020204030204" pitchFamily="34" charset="0"/>
                 <a:cs typeface="Times New Roman" panose="02020603050405020304" pitchFamily="18" charset="0"/>
               </a:rPr>
-              <a:t>As part of this project, we tested the code developed and presented the result in different sections. </a:t>
+              <a:t>As part of this project, tested the code developed and presented the result in different sections. </a:t>
             </a:r>
           </a:p>
           <a:p>
@@ -6732,6 +6732,7 @@
           </a:bodyPr>
           <a:lstStyle/>
           <a:p>
+            <a:pPr algn="just"/>
             <a:r>
               <a:rPr lang="en-US" dirty="0">
                 <a:solidFill>
@@ -6752,6 +6753,7 @@
             </a:endParaRPr>
           </a:p>
           <a:p>
+            <a:pPr algn="just"/>
             <a:r>
               <a:rPr lang="en-US" dirty="0">
                 <a:solidFill>
@@ -6790,6 +6792,7 @@
             </a:r>
           </a:p>
           <a:p>
+            <a:pPr algn="just"/>
             <a:r>
               <a:rPr lang="en-US" dirty="0">
                 <a:solidFill>
@@ -6810,6 +6813,7 @@
             </a:endParaRPr>
           </a:p>
           <a:p>
+            <a:pPr algn="just"/>
             <a:endParaRPr lang="en-US" dirty="0"/>
           </a:p>
         </p:txBody>
@@ -6897,7 +6901,7 @@
         </p:spPr>
         <p:txBody>
           <a:bodyPr>
-            <a:normAutofit lnSpcReduction="10000"/>
+            <a:normAutofit/>
           </a:bodyPr>
           <a:lstStyle/>
           <a:p>
@@ -6911,7 +6915,7 @@
               <a:buNone/>
             </a:pPr>
             <a:r>
-              <a:rPr lang="en-US" sz="2400" dirty="0">
+              <a:rPr lang="en-US" dirty="0">
                 <a:solidFill>
                   <a:srgbClr val="000000"/>
                 </a:solidFill>
@@ -6922,7 +6926,7 @@
               </a:rPr>
               <a:t>The objectives of my project are as follows:</a:t>
             </a:r>
-            <a:endParaRPr lang="en-US" sz="2400" dirty="0">
+            <a:endParaRPr lang="en-US" dirty="0">
               <a:effectLst/>
               <a:latin typeface="Calibri" panose="020F0502020204030204" pitchFamily="34" charset="0"/>
               <a:ea typeface="Calibri" panose="020F0502020204030204" pitchFamily="34" charset="0"/>
@@ -6948,7 +6952,7 @@
               </a:tabLst>
             </a:pPr>
             <a:r>
-              <a:rPr lang="en-US" sz="2600" dirty="0">
+              <a:rPr lang="en-US" sz="2000" dirty="0">
                 <a:solidFill>
                   <a:srgbClr val="000000"/>
                 </a:solidFill>
@@ -6959,7 +6963,7 @@
               </a:rPr>
               <a:t>Creating a custom SPI IP from Xilinx IP Integrator</a:t>
             </a:r>
-            <a:endParaRPr lang="en-US" sz="2200" dirty="0">
+            <a:endParaRPr lang="en-US" sz="2000" dirty="0">
               <a:effectLst/>
               <a:latin typeface="Calibri" panose="020F0502020204030204" pitchFamily="34" charset="0"/>
               <a:ea typeface="Calibri" panose="020F0502020204030204" pitchFamily="34" charset="0"/>
@@ -6985,7 +6989,7 @@
               </a:tabLst>
             </a:pPr>
             <a:r>
-              <a:rPr lang="en-US" sz="2600" dirty="0">
+              <a:rPr lang="en-US" sz="2000" dirty="0">
                 <a:solidFill>
                   <a:srgbClr val="000000"/>
                 </a:solidFill>
@@ -6996,7 +7000,7 @@
               </a:rPr>
               <a:t>Creating an ecosystem to validate this IP </a:t>
             </a:r>
-            <a:endParaRPr lang="en-US" sz="2200" dirty="0">
+            <a:endParaRPr lang="en-US" sz="2000" dirty="0">
               <a:effectLst/>
               <a:latin typeface="Calibri" panose="020F0502020204030204" pitchFamily="34" charset="0"/>
               <a:ea typeface="Calibri" panose="020F0502020204030204" pitchFamily="34" charset="0"/>
@@ -7022,7 +7026,7 @@
               </a:tabLst>
             </a:pPr>
             <a:r>
-              <a:rPr lang="en-US" sz="2600" dirty="0">
+              <a:rPr lang="en-US" sz="2000" dirty="0">
                 <a:solidFill>
                   <a:srgbClr val="000000"/>
                 </a:solidFill>
@@ -7033,7 +7037,7 @@
               </a:rPr>
               <a:t>Understanding the hardware specification of IP</a:t>
             </a:r>
-            <a:endParaRPr lang="en-US" sz="2200" dirty="0">
+            <a:endParaRPr lang="en-US" sz="2000" dirty="0">
               <a:effectLst/>
               <a:latin typeface="Calibri" panose="020F0502020204030204" pitchFamily="34" charset="0"/>
               <a:ea typeface="Calibri" panose="020F0502020204030204" pitchFamily="34" charset="0"/>
@@ -7059,7 +7063,7 @@
               </a:tabLst>
             </a:pPr>
             <a:r>
-              <a:rPr lang="en-US" sz="2600" dirty="0">
+              <a:rPr lang="en-US" sz="2000" dirty="0">
                 <a:solidFill>
                   <a:srgbClr val="000000"/>
                 </a:solidFill>
@@ -7070,7 +7074,7 @@
               </a:rPr>
               <a:t>Writing a test spec from the Hardware Specification</a:t>
             </a:r>
-            <a:endParaRPr lang="en-US" sz="2200" dirty="0">
+            <a:endParaRPr lang="en-US" sz="2000" dirty="0">
               <a:effectLst/>
               <a:latin typeface="Calibri" panose="020F0502020204030204" pitchFamily="34" charset="0"/>
               <a:ea typeface="Calibri" panose="020F0502020204030204" pitchFamily="34" charset="0"/>
@@ -7096,7 +7100,7 @@
               </a:tabLst>
             </a:pPr>
             <a:r>
-              <a:rPr lang="en-US" sz="2600" dirty="0">
+              <a:rPr lang="en-US" sz="2000" dirty="0">
                 <a:solidFill>
                   <a:srgbClr val="000000"/>
                 </a:solidFill>
@@ -7107,7 +7111,7 @@
               </a:rPr>
               <a:t>Creating the testcases to qualify the IP</a:t>
             </a:r>
-            <a:endParaRPr lang="en-US" sz="2200" dirty="0">
+            <a:endParaRPr lang="en-US" sz="2000" dirty="0">
               <a:effectLst/>
               <a:latin typeface="Calibri" panose="020F0502020204030204" pitchFamily="34" charset="0"/>
               <a:ea typeface="Calibri" panose="020F0502020204030204" pitchFamily="34" charset="0"/>
@@ -7133,7 +7137,7 @@
               </a:tabLst>
             </a:pPr>
             <a:r>
-              <a:rPr lang="en-US" sz="2600" dirty="0">
+              <a:rPr lang="en-US" sz="2000" dirty="0">
                 <a:solidFill>
                   <a:srgbClr val="000000"/>
                 </a:solidFill>
@@ -7144,7 +7148,7 @@
               </a:rPr>
               <a:t>Collecting the Output waveforms from the Xilinx ILA</a:t>
             </a:r>
-            <a:endParaRPr lang="en-US" sz="2200" dirty="0">
+            <a:endParaRPr lang="en-US" sz="2000" dirty="0">
               <a:effectLst/>
               <a:latin typeface="Calibri" panose="020F0502020204030204" pitchFamily="34" charset="0"/>
               <a:ea typeface="Calibri" panose="020F0502020204030204" pitchFamily="34" charset="0"/>
@@ -7152,6 +7156,7 @@
             </a:endParaRPr>
           </a:p>
           <a:p>
+            <a:pPr algn="just"/>
             <a:endParaRPr lang="en-US" dirty="0"/>
           </a:p>
         </p:txBody>
@@ -9191,8 +9196,8 @@
         </p:blipFill>
         <p:spPr bwMode="auto">
           <a:xfrm>
-            <a:off x="-2" y="678729"/>
-            <a:ext cx="7145520" cy="2691847"/>
+            <a:off x="-2" y="578843"/>
+            <a:ext cx="7145520" cy="2791734"/>
           </a:xfrm>
           <a:prstGeom prst="rect">
             <a:avLst/>
@@ -9578,7 +9583,7 @@
         </p:blipFill>
         <p:spPr>
           <a:xfrm>
-            <a:off x="1271587" y="85725"/>
+            <a:off x="1756219" y="85725"/>
             <a:ext cx="9648825" cy="6686550"/>
           </a:xfrm>
           <a:prstGeom prst="rect">
@@ -9586,6 +9591,42 @@
           </a:prstGeom>
         </p:spPr>
       </p:pic>
+      <p:sp>
+        <p:nvSpPr>
+          <p:cNvPr id="2" name="TextBox 1">
+            <a:extLst>
+              <a:ext uri="{FF2B5EF4-FFF2-40B4-BE49-F238E27FC236}">
+                <a16:creationId xmlns:a16="http://schemas.microsoft.com/office/drawing/2014/main" id="{5D17BD8D-124A-99BC-7BF5-6208BCE02F3F}"/>
+              </a:ext>
+            </a:extLst>
+          </p:cNvPr>
+          <p:cNvSpPr txBox="1"/>
+          <p:nvPr/>
+        </p:nvSpPr>
+        <p:spPr>
+          <a:xfrm rot="16200000">
+            <a:off x="-2221992" y="3234118"/>
+            <a:ext cx="6253966" cy="646331"/>
+          </a:xfrm>
+          <a:prstGeom prst="rect">
+            <a:avLst/>
+          </a:prstGeom>
+          <a:noFill/>
+        </p:spPr>
+        <p:txBody>
+          <a:bodyPr wrap="square" rtlCol="0">
+            <a:spAutoFit/>
+          </a:bodyPr>
+          <a:lstStyle/>
+          <a:p>
+            <a:pPr algn="ctr"/>
+            <a:r>
+              <a:rPr lang="en-US" sz="3600" dirty="0"/>
+              <a:t>CODEFLOW CHART</a:t>
+            </a:r>
+          </a:p>
+        </p:txBody>
+      </p:sp>
     </p:spTree>
     <p:extLst>
       <p:ext uri="{BB962C8B-B14F-4D97-AF65-F5344CB8AC3E}">

</xml_diff>